<commit_message>
Added empty esm-master sides
</commit_message>
<xml_diff>
--- a/esm-master.pptx
+++ b/esm-master.pptx
@@ -6,7 +6,7 @@
   </p:sldMasterIdLst>
   <p:sldIdLst>
     <p:sldId id="256" r:id="rId2"/>
-    <p:sldId id="258" r:id="rId3"/>
+    <p:sldId id="259" r:id="rId3"/>
   </p:sldIdLst>
   <p:sldSz cx="9144000" cy="6858000" type="screen4x3"/>
   <p:notesSz cx="6858000" cy="9144000"/>
@@ -7849,28 +7849,8 @@
           <a:lstStyle/>
           <a:p>
             <a:r>
-              <a:rPr lang="de-DE" dirty="0" err="1" smtClean="0"/>
-              <a:t>Get</a:t>
-            </a:r>
-            <a:r>
               <a:rPr lang="de-DE" dirty="0" smtClean="0"/>
-              <a:t> </a:t>
-            </a:r>
-            <a:r>
-              <a:rPr lang="de-DE" dirty="0" err="1" smtClean="0"/>
-              <a:t>it</a:t>
-            </a:r>
-            <a:r>
-              <a:rPr lang="de-DE" dirty="0" smtClean="0"/>
-              <a:t> </a:t>
-            </a:r>
-            <a:r>
-              <a:rPr lang="de-DE" dirty="0" err="1" smtClean="0"/>
-              <a:t>from</a:t>
-            </a:r>
-            <a:r>
-              <a:rPr lang="de-DE" dirty="0" smtClean="0"/>
-              <a:t>:</a:t>
+              <a:t>Download:</a:t>
             </a:r>
             <a:endParaRPr lang="de-DE" dirty="0"/>
           </a:p>
@@ -7888,40 +7868,276 @@
         </p:nvSpPr>
         <p:spPr>
           <a:xfrm>
-            <a:off x="900113" y="2114886"/>
-            <a:ext cx="7455150" cy="3931920"/>
+            <a:off x="454526" y="2114886"/>
+            <a:ext cx="8301790" cy="3931920"/>
           </a:xfrm>
         </p:spPr>
         <p:txBody>
-          <a:bodyPr/>
+          <a:bodyPr>
+            <a:normAutofit/>
+          </a:bodyPr>
           <a:lstStyle/>
           <a:p>
             <a:pPr marL="0" indent="0" algn="ctr">
               <a:buNone/>
             </a:pPr>
             <a:r>
+              <a:rPr lang="de-DE" dirty="0" smtClean="0">
+                <a:latin typeface="STIXNonUnicode-Regular"/>
+                <a:cs typeface="STIXNonUnicode-Regular"/>
+              </a:rPr>
+              <a:t>`</a:t>
+            </a:r>
+            <a:r>
+              <a:rPr lang="de-DE" dirty="0" err="1" smtClean="0">
+                <a:latin typeface="STIXNonUnicode-Regular"/>
+                <a:cs typeface="STIXNonUnicode-Regular"/>
+              </a:rPr>
+              <a:t>git</a:t>
+            </a:r>
+            <a:r>
+              <a:rPr lang="de-DE" dirty="0" smtClean="0">
+                <a:latin typeface="STIXNonUnicode-Regular"/>
+                <a:cs typeface="STIXNonUnicode-Regular"/>
+              </a:rPr>
+              <a:t> </a:t>
+            </a:r>
+            <a:r>
+              <a:rPr lang="de-DE" dirty="0" err="1" smtClean="0">
+                <a:latin typeface="STIXNonUnicode-Regular"/>
+                <a:cs typeface="STIXNonUnicode-Regular"/>
+              </a:rPr>
+              <a:t>clone</a:t>
+            </a:r>
+            <a:r>
+              <a:rPr lang="de-DE" dirty="0" smtClean="0">
+                <a:latin typeface="STIXNonUnicode-Regular"/>
+                <a:cs typeface="STIXNonUnicode-Regular"/>
+              </a:rPr>
+              <a:t> https</a:t>
+            </a:r>
+            <a:r>
+              <a:rPr lang="de-DE" dirty="0">
+                <a:latin typeface="STIXNonUnicode-Regular"/>
+                <a:cs typeface="STIXNonUnicode-Regular"/>
+              </a:rPr>
+              <a:t>//</a:t>
+            </a:r>
+            <a:r>
+              <a:rPr lang="de-DE" dirty="0" err="1">
+                <a:latin typeface="STIXNonUnicode-Regular"/>
+                <a:cs typeface="STIXNonUnicode-Regular"/>
+              </a:rPr>
+              <a:t>gitlab.dkrz.de</a:t>
+            </a:r>
+            <a:r>
+              <a:rPr lang="de-DE" dirty="0">
+                <a:latin typeface="STIXNonUnicode-Regular"/>
+                <a:cs typeface="STIXNonUnicode-Regular"/>
+              </a:rPr>
+              <a:t>/</a:t>
+            </a:r>
+            <a:r>
+              <a:rPr lang="de-DE" dirty="0" err="1">
+                <a:latin typeface="STIXNonUnicode-Regular"/>
+                <a:cs typeface="STIXNonUnicode-Regular"/>
+              </a:rPr>
+              <a:t>esm</a:t>
+            </a:r>
+            <a:r>
+              <a:rPr lang="de-DE" dirty="0">
+                <a:latin typeface="STIXNonUnicode-Regular"/>
+                <a:cs typeface="STIXNonUnicode-Regular"/>
+              </a:rPr>
+              <a:t>-tools/</a:t>
+            </a:r>
+            <a:r>
+              <a:rPr lang="de-DE" dirty="0" err="1">
+                <a:latin typeface="STIXNonUnicode-Regular"/>
+                <a:cs typeface="STIXNonUnicode-Regular"/>
+              </a:rPr>
+              <a:t>esm-</a:t>
+            </a:r>
+            <a:r>
+              <a:rPr lang="de-DE" dirty="0" err="1" smtClean="0">
+                <a:latin typeface="STIXNonUnicode-Regular"/>
+                <a:cs typeface="STIXNonUnicode-Regular"/>
+              </a:rPr>
+              <a:t>master.git</a:t>
+            </a:r>
+            <a:r>
+              <a:rPr lang="de-DE" dirty="0" smtClean="0">
+                <a:latin typeface="STIXNonUnicode-Regular"/>
+                <a:cs typeface="STIXNonUnicode-Regular"/>
+              </a:rPr>
+              <a:t>`</a:t>
+            </a:r>
+            <a:endParaRPr lang="de-DE" dirty="0" smtClean="0">
+              <a:latin typeface="STIXNonUnicode-Regular"/>
+              <a:cs typeface="STIXNonUnicode-Regular"/>
+            </a:endParaRPr>
+          </a:p>
+          <a:p>
+            <a:pPr marL="0" indent="0" algn="ctr">
+              <a:buNone/>
+            </a:pPr>
+            <a:endParaRPr lang="de-DE" dirty="0"/>
+          </a:p>
+          <a:p>
+            <a:pPr marL="0" indent="0" algn="ctr">
+              <a:spcBef>
+                <a:spcPts val="200"/>
+              </a:spcBef>
+              <a:buNone/>
+            </a:pPr>
+            <a:r>
+              <a:rPr lang="de-DE" dirty="0" err="1" smtClean="0"/>
+              <a:t>No</a:t>
+            </a:r>
+            <a:r>
               <a:rPr lang="de-DE" dirty="0" smtClean="0"/>
-              <a:t>https//</a:t>
+              <a:t> </a:t>
             </a:r>
             <a:r>
               <a:rPr lang="de-DE" dirty="0" err="1" smtClean="0"/>
-              <a:t>gitlab.dkrz.de</a:t>
+              <a:t>installation</a:t>
             </a:r>
             <a:r>
               <a:rPr lang="de-DE" dirty="0" smtClean="0"/>
-              <a:t>/</a:t>
+              <a:t> </a:t>
             </a:r>
             <a:r>
               <a:rPr lang="de-DE" dirty="0" err="1" smtClean="0"/>
-              <a:t>esm</a:t>
+              <a:t>required</a:t>
             </a:r>
             <a:r>
               <a:rPr lang="de-DE" dirty="0" smtClean="0"/>
-              <a:t>-tools/</a:t>
-            </a:r>
+              <a:t>, </a:t>
+            </a:r>
+          </a:p>
+          <a:p>
+            <a:pPr marL="0" indent="0" algn="ctr">
+              <a:spcBef>
+                <a:spcPts val="200"/>
+              </a:spcBef>
+              <a:buNone/>
+            </a:pPr>
             <a:r>
               <a:rPr lang="de-DE" dirty="0" err="1" smtClean="0"/>
-              <a:t>esm-master.git</a:t>
+              <a:t>configuration</a:t>
+            </a:r>
+            <a:r>
+              <a:rPr lang="de-DE" dirty="0" smtClean="0"/>
+              <a:t> </a:t>
+            </a:r>
+            <a:r>
+              <a:rPr lang="de-DE" dirty="0" err="1" smtClean="0"/>
+              <a:t>happens</a:t>
+            </a:r>
+            <a:r>
+              <a:rPr lang="de-DE" dirty="0" smtClean="0"/>
+              <a:t> </a:t>
+            </a:r>
+            <a:r>
+              <a:rPr lang="de-DE" dirty="0" err="1" smtClean="0"/>
+              <a:t>automatically</a:t>
+            </a:r>
+            <a:endParaRPr lang="de-DE" dirty="0" smtClean="0"/>
+          </a:p>
+          <a:p>
+            <a:pPr marL="0" indent="0" algn="ctr">
+              <a:spcBef>
+                <a:spcPts val="800"/>
+              </a:spcBef>
+              <a:buNone/>
+            </a:pPr>
+            <a:endParaRPr lang="de-DE" dirty="0" smtClean="0"/>
+          </a:p>
+          <a:p>
+            <a:pPr marL="0" indent="0" algn="ctr">
+              <a:spcBef>
+                <a:spcPts val="800"/>
+              </a:spcBef>
+              <a:buNone/>
+            </a:pPr>
+            <a:r>
+              <a:rPr lang="de-DE" dirty="0" err="1"/>
+              <a:t>N</a:t>
+            </a:r>
+            <a:r>
+              <a:rPr lang="de-DE" dirty="0" err="1" smtClean="0"/>
+              <a:t>ow</a:t>
+            </a:r>
+            <a:r>
+              <a:rPr lang="de-DE" dirty="0" smtClean="0"/>
+              <a:t> type </a:t>
+            </a:r>
+          </a:p>
+          <a:p>
+            <a:pPr marL="0" indent="0" algn="ctr">
+              <a:spcBef>
+                <a:spcPts val="800"/>
+              </a:spcBef>
+              <a:buNone/>
+            </a:pPr>
+            <a:r>
+              <a:rPr lang="de-DE" dirty="0" smtClean="0"/>
+              <a:t>`</a:t>
+            </a:r>
+            <a:r>
+              <a:rPr lang="de-DE" dirty="0" err="1" smtClean="0">
+                <a:latin typeface="STIXNonUnicode-Regular"/>
+                <a:cs typeface="STIXNonUnicode-Regular"/>
+              </a:rPr>
+              <a:t>make</a:t>
+            </a:r>
+            <a:r>
+              <a:rPr lang="de-DE" dirty="0" smtClean="0"/>
+              <a:t>`</a:t>
+            </a:r>
+            <a:r>
+              <a:rPr lang="de-DE" dirty="0" smtClean="0"/>
+              <a:t> </a:t>
+            </a:r>
+          </a:p>
+          <a:p>
+            <a:pPr marL="0" indent="0" algn="ctr">
+              <a:spcBef>
+                <a:spcPts val="800"/>
+              </a:spcBef>
+              <a:buNone/>
+            </a:pPr>
+            <a:r>
+              <a:rPr lang="de-DE" dirty="0" err="1" smtClean="0"/>
+              <a:t>to</a:t>
+            </a:r>
+            <a:r>
+              <a:rPr lang="de-DE" dirty="0" smtClean="0"/>
+              <a:t> </a:t>
+            </a:r>
+            <a:r>
+              <a:rPr lang="de-DE" dirty="0" err="1" smtClean="0"/>
+              <a:t>see</a:t>
+            </a:r>
+            <a:r>
+              <a:rPr lang="de-DE" dirty="0" smtClean="0"/>
+              <a:t> </a:t>
+            </a:r>
+            <a:r>
+              <a:rPr lang="de-DE" dirty="0" err="1" smtClean="0"/>
+              <a:t>what</a:t>
+            </a:r>
+            <a:r>
+              <a:rPr lang="de-DE" dirty="0" smtClean="0"/>
+              <a:t> </a:t>
+            </a:r>
+            <a:r>
+              <a:rPr lang="de-DE" dirty="0" err="1" smtClean="0"/>
+              <a:t>happens</a:t>
+            </a:r>
+            <a:r>
+              <a:rPr lang="de-DE" dirty="0" smtClean="0"/>
+              <a:t>!</a:t>
             </a:r>
             <a:endParaRPr lang="de-DE" dirty="0"/>
           </a:p>
@@ -7930,7 +8146,7 @@
     </p:spTree>
     <p:extLst>
       <p:ext uri="{BB962C8B-B14F-4D97-AF65-F5344CB8AC3E}">
-        <p14:creationId xmlns:p14="http://schemas.microsoft.com/office/powerpoint/2010/main" val="2965172620"/>
+        <p14:creationId xmlns:p14="http://schemas.microsoft.com/office/powerpoint/2010/main" val="1727852475"/>
       </p:ext>
     </p:extLst>
   </p:cSld>

</xml_diff>